<commit_message>
add logos without title
</commit_message>
<xml_diff>
--- a/logos.pptx
+++ b/logos.pptx
@@ -10,6 +10,11 @@
     <p:sldId id="258" r:id="rId4"/>
     <p:sldId id="259" r:id="rId5"/>
     <p:sldId id="260" r:id="rId6"/>
+    <p:sldId id="262" r:id="rId7"/>
+    <p:sldId id="264" r:id="rId8"/>
+    <p:sldId id="265" r:id="rId9"/>
+    <p:sldId id="266" r:id="rId10"/>
+    <p:sldId id="263" r:id="rId11"/>
   </p:sldIdLst>
   <p:sldSz cx="21396325" cy="21396325"/>
   <p:notesSz cx="6858000" cy="9144000"/>
@@ -108,6 +113,11 @@
       </a:defRPr>
     </a:lvl9pPr>
   </p:defaultTextStyle>
+  <p:extLst>
+    <p:ext uri="{EFAFB233-063F-42B5-8137-9DF3F51BA10A}">
+      <p15:sldGuideLst xmlns:p15="http://schemas.microsoft.com/office/powerpoint/2012/main"/>
+    </p:ext>
+  </p:extLst>
 </p:presentation>
 </file>
 
@@ -3160,6 +3170,129 @@
 </p:sld>
 </file>
 
+<file path=ppt/slides/slide10.xml><?xml version="1.0" encoding="utf-8"?>
+<p:sld xmlns:a="http://schemas.openxmlformats.org/drawingml/2006/main" xmlns:r="http://schemas.openxmlformats.org/officeDocument/2006/relationships" xmlns:p="http://schemas.openxmlformats.org/presentationml/2006/main">
+  <p:cSld>
+    <p:spTree>
+      <p:nvGrpSpPr>
+        <p:cNvPr id="1" name=""/>
+        <p:cNvGrpSpPr/>
+        <p:nvPr/>
+      </p:nvGrpSpPr>
+      <p:grpSpPr>
+        <a:xfrm>
+          <a:off x="0" y="0"/>
+          <a:ext cx="0" cy="0"/>
+          <a:chOff x="0" y="0"/>
+          <a:chExt cx="0" cy="0"/>
+        </a:xfrm>
+      </p:grpSpPr>
+      <p:sp>
+        <p:nvSpPr>
+          <p:cNvPr id="4" name="Flowchart: Connector 3">
+            <a:extLst>
+              <a:ext uri="{FF2B5EF4-FFF2-40B4-BE49-F238E27FC236}">
+                <a16:creationId xmlns:a16="http://schemas.microsoft.com/office/drawing/2014/main" id="{DF4A68AA-3EBB-4197-99F0-1A14EEDE38A2}"/>
+              </a:ext>
+            </a:extLst>
+          </p:cNvPr>
+          <p:cNvSpPr/>
+          <p:nvPr/>
+        </p:nvSpPr>
+        <p:spPr>
+          <a:xfrm>
+            <a:off x="1554162" y="1554162"/>
+            <a:ext cx="18288000" cy="18288000"/>
+          </a:xfrm>
+          <a:prstGeom prst="flowChartConnector">
+            <a:avLst/>
+          </a:prstGeom>
+          <a:noFill/>
+          <a:ln w="152400">
+            <a:solidFill>
+              <a:srgbClr val="32A350"/>
+            </a:solidFill>
+          </a:ln>
+        </p:spPr>
+        <p:style>
+          <a:lnRef idx="2">
+            <a:schemeClr val="accent1">
+              <a:shade val="50000"/>
+            </a:schemeClr>
+          </a:lnRef>
+          <a:fillRef idx="1">
+            <a:schemeClr val="accent1"/>
+          </a:fillRef>
+          <a:effectRef idx="0">
+            <a:schemeClr val="accent1"/>
+          </a:effectRef>
+          <a:fontRef idx="minor">
+            <a:schemeClr val="lt1"/>
+          </a:fontRef>
+        </p:style>
+        <p:txBody>
+          <a:bodyPr rtlCol="0" anchor="ctr"/>
+          <a:lstStyle/>
+          <a:p>
+            <a:pPr algn="ctr"/>
+            <a:endParaRPr lang="en-US" dirty="0">
+              <a:noFill/>
+            </a:endParaRPr>
+          </a:p>
+        </p:txBody>
+      </p:sp>
+      <p:pic>
+        <p:nvPicPr>
+          <p:cNvPr id="17" name="Graphic 16" descr="Quill with solid fill">
+            <a:extLst>
+              <a:ext uri="{FF2B5EF4-FFF2-40B4-BE49-F238E27FC236}">
+                <a16:creationId xmlns:a16="http://schemas.microsoft.com/office/drawing/2014/main" id="{89D2497B-8C39-462E-B71D-3751E5819209}"/>
+              </a:ext>
+            </a:extLst>
+          </p:cNvPr>
+          <p:cNvPicPr>
+            <a:picLocks noChangeAspect="1"/>
+          </p:cNvPicPr>
+          <p:nvPr/>
+        </p:nvPicPr>
+        <p:blipFill>
+          <a:blip r:embed="rId2">
+            <a:extLst>
+              <a:ext uri="{28A0092B-C50C-407E-A947-70E740481C1C}">
+                <a14:useLocalDpi xmlns:a14="http://schemas.microsoft.com/office/drawing/2010/main" val="0"/>
+              </a:ext>
+              <a:ext uri="{96DAC541-7B7A-43D3-8B79-37D633B846F1}">
+                <asvg:svgBlip xmlns:asvg="http://schemas.microsoft.com/office/drawing/2016/SVG/main" r:embed="rId3"/>
+              </a:ext>
+            </a:extLst>
+          </a:blip>
+          <a:stretch>
+            <a:fillRect/>
+          </a:stretch>
+        </p:blipFill>
+        <p:spPr>
+          <a:xfrm>
+            <a:off x="3382962" y="3382962"/>
+            <a:ext cx="14630400" cy="14630400"/>
+          </a:xfrm>
+          <a:prstGeom prst="rect">
+            <a:avLst/>
+          </a:prstGeom>
+        </p:spPr>
+      </p:pic>
+    </p:spTree>
+    <p:extLst>
+      <p:ext uri="{BB962C8B-B14F-4D97-AF65-F5344CB8AC3E}">
+        <p14:creationId xmlns:p14="http://schemas.microsoft.com/office/powerpoint/2010/main" val="2914898075"/>
+      </p:ext>
+    </p:extLst>
+  </p:cSld>
+  <p:clrMapOvr>
+    <a:masterClrMapping/>
+  </p:clrMapOvr>
+</p:sld>
+</file>
+
 <file path=ppt/slides/slide2.xml><?xml version="1.0" encoding="utf-8"?>
 <p:sld xmlns:a="http://schemas.openxmlformats.org/drawingml/2006/main" xmlns:r="http://schemas.openxmlformats.org/officeDocument/2006/relationships" xmlns:p="http://schemas.openxmlformats.org/presentationml/2006/main">
   <p:cSld>
@@ -4075,6 +4208,498 @@
     <p:extLst>
       <p:ext uri="{BB962C8B-B14F-4D97-AF65-F5344CB8AC3E}">
         <p14:creationId xmlns:p14="http://schemas.microsoft.com/office/powerpoint/2010/main" val="2008690717"/>
+      </p:ext>
+    </p:extLst>
+  </p:cSld>
+  <p:clrMapOvr>
+    <a:masterClrMapping/>
+  </p:clrMapOvr>
+</p:sld>
+</file>
+
+<file path=ppt/slides/slide6.xml><?xml version="1.0" encoding="utf-8"?>
+<p:sld xmlns:a="http://schemas.openxmlformats.org/drawingml/2006/main" xmlns:r="http://schemas.openxmlformats.org/officeDocument/2006/relationships" xmlns:p="http://schemas.openxmlformats.org/presentationml/2006/main">
+  <p:cSld>
+    <p:spTree>
+      <p:nvGrpSpPr>
+        <p:cNvPr id="1" name=""/>
+        <p:cNvGrpSpPr/>
+        <p:nvPr/>
+      </p:nvGrpSpPr>
+      <p:grpSpPr>
+        <a:xfrm>
+          <a:off x="0" y="0"/>
+          <a:ext cx="0" cy="0"/>
+          <a:chOff x="0" y="0"/>
+          <a:chExt cx="0" cy="0"/>
+        </a:xfrm>
+      </p:grpSpPr>
+      <p:sp>
+        <p:nvSpPr>
+          <p:cNvPr id="4" name="Flowchart: Connector 3">
+            <a:extLst>
+              <a:ext uri="{FF2B5EF4-FFF2-40B4-BE49-F238E27FC236}">
+                <a16:creationId xmlns:a16="http://schemas.microsoft.com/office/drawing/2014/main" id="{DF4A68AA-3EBB-4197-99F0-1A14EEDE38A2}"/>
+              </a:ext>
+            </a:extLst>
+          </p:cNvPr>
+          <p:cNvSpPr/>
+          <p:nvPr/>
+        </p:nvSpPr>
+        <p:spPr>
+          <a:xfrm>
+            <a:off x="1554162" y="1554162"/>
+            <a:ext cx="18288000" cy="18288000"/>
+          </a:xfrm>
+          <a:prstGeom prst="flowChartConnector">
+            <a:avLst/>
+          </a:prstGeom>
+          <a:noFill/>
+          <a:ln w="152400">
+            <a:solidFill>
+              <a:schemeClr val="tx1"/>
+            </a:solidFill>
+          </a:ln>
+        </p:spPr>
+        <p:style>
+          <a:lnRef idx="2">
+            <a:schemeClr val="accent1">
+              <a:shade val="50000"/>
+            </a:schemeClr>
+          </a:lnRef>
+          <a:fillRef idx="1">
+            <a:schemeClr val="accent1"/>
+          </a:fillRef>
+          <a:effectRef idx="0">
+            <a:schemeClr val="accent1"/>
+          </a:effectRef>
+          <a:fontRef idx="minor">
+            <a:schemeClr val="lt1"/>
+          </a:fontRef>
+        </p:style>
+        <p:txBody>
+          <a:bodyPr rtlCol="0" anchor="ctr"/>
+          <a:lstStyle/>
+          <a:p>
+            <a:pPr algn="ctr"/>
+            <a:endParaRPr lang="en-US" dirty="0">
+              <a:noFill/>
+            </a:endParaRPr>
+          </a:p>
+        </p:txBody>
+      </p:sp>
+      <p:pic>
+        <p:nvPicPr>
+          <p:cNvPr id="17" name="Graphic 16" descr="Quill with solid fill">
+            <a:extLst>
+              <a:ext uri="{FF2B5EF4-FFF2-40B4-BE49-F238E27FC236}">
+                <a16:creationId xmlns:a16="http://schemas.microsoft.com/office/drawing/2014/main" id="{89D2497B-8C39-462E-B71D-3751E5819209}"/>
+              </a:ext>
+            </a:extLst>
+          </p:cNvPr>
+          <p:cNvPicPr>
+            <a:picLocks noChangeAspect="1"/>
+          </p:cNvPicPr>
+          <p:nvPr/>
+        </p:nvPicPr>
+        <p:blipFill>
+          <a:blip r:embed="rId2">
+            <a:extLst>
+              <a:ext uri="{28A0092B-C50C-407E-A947-70E740481C1C}">
+                <a14:useLocalDpi xmlns:a14="http://schemas.microsoft.com/office/drawing/2010/main" val="0"/>
+              </a:ext>
+              <a:ext uri="{96DAC541-7B7A-43D3-8B79-37D633B846F1}">
+                <asvg:svgBlip xmlns:asvg="http://schemas.microsoft.com/office/drawing/2016/SVG/main" r:embed="rId3"/>
+              </a:ext>
+            </a:extLst>
+          </a:blip>
+          <a:stretch>
+            <a:fillRect/>
+          </a:stretch>
+        </p:blipFill>
+        <p:spPr>
+          <a:xfrm>
+            <a:off x="3382962" y="3382962"/>
+            <a:ext cx="14630400" cy="14630400"/>
+          </a:xfrm>
+          <a:prstGeom prst="rect">
+            <a:avLst/>
+          </a:prstGeom>
+        </p:spPr>
+      </p:pic>
+    </p:spTree>
+    <p:extLst>
+      <p:ext uri="{BB962C8B-B14F-4D97-AF65-F5344CB8AC3E}">
+        <p14:creationId xmlns:p14="http://schemas.microsoft.com/office/powerpoint/2010/main" val="3809268426"/>
+      </p:ext>
+    </p:extLst>
+  </p:cSld>
+  <p:clrMapOvr>
+    <a:masterClrMapping/>
+  </p:clrMapOvr>
+</p:sld>
+</file>
+
+<file path=ppt/slides/slide7.xml><?xml version="1.0" encoding="utf-8"?>
+<p:sld xmlns:a="http://schemas.openxmlformats.org/drawingml/2006/main" xmlns:r="http://schemas.openxmlformats.org/officeDocument/2006/relationships" xmlns:p="http://schemas.openxmlformats.org/presentationml/2006/main">
+  <p:cSld>
+    <p:spTree>
+      <p:nvGrpSpPr>
+        <p:cNvPr id="1" name=""/>
+        <p:cNvGrpSpPr/>
+        <p:nvPr/>
+      </p:nvGrpSpPr>
+      <p:grpSpPr>
+        <a:xfrm>
+          <a:off x="0" y="0"/>
+          <a:ext cx="0" cy="0"/>
+          <a:chOff x="0" y="0"/>
+          <a:chExt cx="0" cy="0"/>
+        </a:xfrm>
+      </p:grpSpPr>
+      <p:sp>
+        <p:nvSpPr>
+          <p:cNvPr id="4" name="Flowchart: Connector 3">
+            <a:extLst>
+              <a:ext uri="{FF2B5EF4-FFF2-40B4-BE49-F238E27FC236}">
+                <a16:creationId xmlns:a16="http://schemas.microsoft.com/office/drawing/2014/main" id="{DF4A68AA-3EBB-4197-99F0-1A14EEDE38A2}"/>
+              </a:ext>
+            </a:extLst>
+          </p:cNvPr>
+          <p:cNvSpPr/>
+          <p:nvPr/>
+        </p:nvSpPr>
+        <p:spPr>
+          <a:xfrm>
+            <a:off x="1554162" y="1554162"/>
+            <a:ext cx="18288000" cy="18288000"/>
+          </a:xfrm>
+          <a:prstGeom prst="flowChartConnector">
+            <a:avLst/>
+          </a:prstGeom>
+          <a:noFill/>
+          <a:ln w="152400">
+            <a:solidFill>
+              <a:srgbClr val="4081EC"/>
+            </a:solidFill>
+          </a:ln>
+        </p:spPr>
+        <p:style>
+          <a:lnRef idx="2">
+            <a:schemeClr val="accent1">
+              <a:shade val="50000"/>
+            </a:schemeClr>
+          </a:lnRef>
+          <a:fillRef idx="1">
+            <a:schemeClr val="accent1"/>
+          </a:fillRef>
+          <a:effectRef idx="0">
+            <a:schemeClr val="accent1"/>
+          </a:effectRef>
+          <a:fontRef idx="minor">
+            <a:schemeClr val="lt1"/>
+          </a:fontRef>
+        </p:style>
+        <p:txBody>
+          <a:bodyPr rtlCol="0" anchor="ctr"/>
+          <a:lstStyle/>
+          <a:p>
+            <a:pPr algn="ctr"/>
+            <a:endParaRPr lang="en-US" dirty="0">
+              <a:noFill/>
+            </a:endParaRPr>
+          </a:p>
+        </p:txBody>
+      </p:sp>
+      <p:pic>
+        <p:nvPicPr>
+          <p:cNvPr id="17" name="Graphic 16" descr="Quill with solid fill">
+            <a:extLst>
+              <a:ext uri="{FF2B5EF4-FFF2-40B4-BE49-F238E27FC236}">
+                <a16:creationId xmlns:a16="http://schemas.microsoft.com/office/drawing/2014/main" id="{89D2497B-8C39-462E-B71D-3751E5819209}"/>
+              </a:ext>
+            </a:extLst>
+          </p:cNvPr>
+          <p:cNvPicPr>
+            <a:picLocks noChangeAspect="1"/>
+          </p:cNvPicPr>
+          <p:nvPr/>
+        </p:nvPicPr>
+        <p:blipFill>
+          <a:blip r:embed="rId2">
+            <a:extLst>
+              <a:ext uri="{28A0092B-C50C-407E-A947-70E740481C1C}">
+                <a14:useLocalDpi xmlns:a14="http://schemas.microsoft.com/office/drawing/2010/main" val="0"/>
+              </a:ext>
+              <a:ext uri="{96DAC541-7B7A-43D3-8B79-37D633B846F1}">
+                <asvg:svgBlip xmlns:asvg="http://schemas.microsoft.com/office/drawing/2016/SVG/main" r:embed="rId3"/>
+              </a:ext>
+            </a:extLst>
+          </a:blip>
+          <a:stretch>
+            <a:fillRect/>
+          </a:stretch>
+        </p:blipFill>
+        <p:spPr>
+          <a:xfrm>
+            <a:off x="3382962" y="3382962"/>
+            <a:ext cx="14630400" cy="14630400"/>
+          </a:xfrm>
+          <a:prstGeom prst="rect">
+            <a:avLst/>
+          </a:prstGeom>
+        </p:spPr>
+      </p:pic>
+    </p:spTree>
+    <p:extLst>
+      <p:ext uri="{BB962C8B-B14F-4D97-AF65-F5344CB8AC3E}">
+        <p14:creationId xmlns:p14="http://schemas.microsoft.com/office/powerpoint/2010/main" val="2225743192"/>
+      </p:ext>
+    </p:extLst>
+  </p:cSld>
+  <p:clrMapOvr>
+    <a:masterClrMapping/>
+  </p:clrMapOvr>
+</p:sld>
+</file>
+
+<file path=ppt/slides/slide8.xml><?xml version="1.0" encoding="utf-8"?>
+<p:sld xmlns:a="http://schemas.openxmlformats.org/drawingml/2006/main" xmlns:r="http://schemas.openxmlformats.org/officeDocument/2006/relationships" xmlns:p="http://schemas.openxmlformats.org/presentationml/2006/main">
+  <p:cSld>
+    <p:spTree>
+      <p:nvGrpSpPr>
+        <p:cNvPr id="1" name=""/>
+        <p:cNvGrpSpPr/>
+        <p:nvPr/>
+      </p:nvGrpSpPr>
+      <p:grpSpPr>
+        <a:xfrm>
+          <a:off x="0" y="0"/>
+          <a:ext cx="0" cy="0"/>
+          <a:chOff x="0" y="0"/>
+          <a:chExt cx="0" cy="0"/>
+        </a:xfrm>
+      </p:grpSpPr>
+      <p:sp>
+        <p:nvSpPr>
+          <p:cNvPr id="4" name="Flowchart: Connector 3">
+            <a:extLst>
+              <a:ext uri="{FF2B5EF4-FFF2-40B4-BE49-F238E27FC236}">
+                <a16:creationId xmlns:a16="http://schemas.microsoft.com/office/drawing/2014/main" id="{DF4A68AA-3EBB-4197-99F0-1A14EEDE38A2}"/>
+              </a:ext>
+            </a:extLst>
+          </p:cNvPr>
+          <p:cNvSpPr/>
+          <p:nvPr/>
+        </p:nvSpPr>
+        <p:spPr>
+          <a:xfrm>
+            <a:off x="1554162" y="1554162"/>
+            <a:ext cx="18288000" cy="18288000"/>
+          </a:xfrm>
+          <a:prstGeom prst="flowChartConnector">
+            <a:avLst/>
+          </a:prstGeom>
+          <a:noFill/>
+          <a:ln w="152400">
+            <a:solidFill>
+              <a:srgbClr val="FF0000"/>
+            </a:solidFill>
+          </a:ln>
+        </p:spPr>
+        <p:style>
+          <a:lnRef idx="2">
+            <a:schemeClr val="accent1">
+              <a:shade val="50000"/>
+            </a:schemeClr>
+          </a:lnRef>
+          <a:fillRef idx="1">
+            <a:schemeClr val="accent1"/>
+          </a:fillRef>
+          <a:effectRef idx="0">
+            <a:schemeClr val="accent1"/>
+          </a:effectRef>
+          <a:fontRef idx="minor">
+            <a:schemeClr val="lt1"/>
+          </a:fontRef>
+        </p:style>
+        <p:txBody>
+          <a:bodyPr rtlCol="0" anchor="ctr"/>
+          <a:lstStyle/>
+          <a:p>
+            <a:pPr algn="ctr"/>
+            <a:endParaRPr lang="en-US" dirty="0">
+              <a:noFill/>
+            </a:endParaRPr>
+          </a:p>
+        </p:txBody>
+      </p:sp>
+      <p:pic>
+        <p:nvPicPr>
+          <p:cNvPr id="17" name="Graphic 16" descr="Quill with solid fill">
+            <a:extLst>
+              <a:ext uri="{FF2B5EF4-FFF2-40B4-BE49-F238E27FC236}">
+                <a16:creationId xmlns:a16="http://schemas.microsoft.com/office/drawing/2014/main" id="{89D2497B-8C39-462E-B71D-3751E5819209}"/>
+              </a:ext>
+            </a:extLst>
+          </p:cNvPr>
+          <p:cNvPicPr>
+            <a:picLocks noChangeAspect="1"/>
+          </p:cNvPicPr>
+          <p:nvPr/>
+        </p:nvPicPr>
+        <p:blipFill>
+          <a:blip r:embed="rId2">
+            <a:extLst>
+              <a:ext uri="{28A0092B-C50C-407E-A947-70E740481C1C}">
+                <a14:useLocalDpi xmlns:a14="http://schemas.microsoft.com/office/drawing/2010/main" val="0"/>
+              </a:ext>
+              <a:ext uri="{96DAC541-7B7A-43D3-8B79-37D633B846F1}">
+                <asvg:svgBlip xmlns:asvg="http://schemas.microsoft.com/office/drawing/2016/SVG/main" r:embed="rId3"/>
+              </a:ext>
+            </a:extLst>
+          </a:blip>
+          <a:stretch>
+            <a:fillRect/>
+          </a:stretch>
+        </p:blipFill>
+        <p:spPr>
+          <a:xfrm>
+            <a:off x="3382962" y="3382962"/>
+            <a:ext cx="14630400" cy="14630400"/>
+          </a:xfrm>
+          <a:prstGeom prst="rect">
+            <a:avLst/>
+          </a:prstGeom>
+        </p:spPr>
+      </p:pic>
+    </p:spTree>
+    <p:extLst>
+      <p:ext uri="{BB962C8B-B14F-4D97-AF65-F5344CB8AC3E}">
+        <p14:creationId xmlns:p14="http://schemas.microsoft.com/office/powerpoint/2010/main" val="1768520810"/>
+      </p:ext>
+    </p:extLst>
+  </p:cSld>
+  <p:clrMapOvr>
+    <a:masterClrMapping/>
+  </p:clrMapOvr>
+</p:sld>
+</file>
+
+<file path=ppt/slides/slide9.xml><?xml version="1.0" encoding="utf-8"?>
+<p:sld xmlns:a="http://schemas.openxmlformats.org/drawingml/2006/main" xmlns:r="http://schemas.openxmlformats.org/officeDocument/2006/relationships" xmlns:p="http://schemas.openxmlformats.org/presentationml/2006/main">
+  <p:cSld>
+    <p:spTree>
+      <p:nvGrpSpPr>
+        <p:cNvPr id="1" name=""/>
+        <p:cNvGrpSpPr/>
+        <p:nvPr/>
+      </p:nvGrpSpPr>
+      <p:grpSpPr>
+        <a:xfrm>
+          <a:off x="0" y="0"/>
+          <a:ext cx="0" cy="0"/>
+          <a:chOff x="0" y="0"/>
+          <a:chExt cx="0" cy="0"/>
+        </a:xfrm>
+      </p:grpSpPr>
+      <p:sp>
+        <p:nvSpPr>
+          <p:cNvPr id="4" name="Flowchart: Connector 3">
+            <a:extLst>
+              <a:ext uri="{FF2B5EF4-FFF2-40B4-BE49-F238E27FC236}">
+                <a16:creationId xmlns:a16="http://schemas.microsoft.com/office/drawing/2014/main" id="{DF4A68AA-3EBB-4197-99F0-1A14EEDE38A2}"/>
+              </a:ext>
+            </a:extLst>
+          </p:cNvPr>
+          <p:cNvSpPr/>
+          <p:nvPr/>
+        </p:nvSpPr>
+        <p:spPr>
+          <a:xfrm>
+            <a:off x="1554162" y="1554162"/>
+            <a:ext cx="18288000" cy="18288000"/>
+          </a:xfrm>
+          <a:prstGeom prst="flowChartConnector">
+            <a:avLst/>
+          </a:prstGeom>
+          <a:noFill/>
+          <a:ln w="152400">
+            <a:solidFill>
+              <a:srgbClr val="F3B604"/>
+            </a:solidFill>
+          </a:ln>
+        </p:spPr>
+        <p:style>
+          <a:lnRef idx="2">
+            <a:schemeClr val="accent1">
+              <a:shade val="50000"/>
+            </a:schemeClr>
+          </a:lnRef>
+          <a:fillRef idx="1">
+            <a:schemeClr val="accent1"/>
+          </a:fillRef>
+          <a:effectRef idx="0">
+            <a:schemeClr val="accent1"/>
+          </a:effectRef>
+          <a:fontRef idx="minor">
+            <a:schemeClr val="lt1"/>
+          </a:fontRef>
+        </p:style>
+        <p:txBody>
+          <a:bodyPr rtlCol="0" anchor="ctr"/>
+          <a:lstStyle/>
+          <a:p>
+            <a:pPr algn="ctr"/>
+            <a:endParaRPr lang="en-US" dirty="0">
+              <a:noFill/>
+            </a:endParaRPr>
+          </a:p>
+        </p:txBody>
+      </p:sp>
+      <p:pic>
+        <p:nvPicPr>
+          <p:cNvPr id="17" name="Graphic 16" descr="Quill with solid fill">
+            <a:extLst>
+              <a:ext uri="{FF2B5EF4-FFF2-40B4-BE49-F238E27FC236}">
+                <a16:creationId xmlns:a16="http://schemas.microsoft.com/office/drawing/2014/main" id="{89D2497B-8C39-462E-B71D-3751E5819209}"/>
+              </a:ext>
+            </a:extLst>
+          </p:cNvPr>
+          <p:cNvPicPr>
+            <a:picLocks noChangeAspect="1"/>
+          </p:cNvPicPr>
+          <p:nvPr/>
+        </p:nvPicPr>
+        <p:blipFill>
+          <a:blip r:embed="rId2">
+            <a:extLst>
+              <a:ext uri="{28A0092B-C50C-407E-A947-70E740481C1C}">
+                <a14:useLocalDpi xmlns:a14="http://schemas.microsoft.com/office/drawing/2010/main" val="0"/>
+              </a:ext>
+              <a:ext uri="{96DAC541-7B7A-43D3-8B79-37D633B846F1}">
+                <asvg:svgBlip xmlns:asvg="http://schemas.microsoft.com/office/drawing/2016/SVG/main" r:embed="rId3"/>
+              </a:ext>
+            </a:extLst>
+          </a:blip>
+          <a:stretch>
+            <a:fillRect/>
+          </a:stretch>
+        </p:blipFill>
+        <p:spPr>
+          <a:xfrm>
+            <a:off x="3382962" y="3382962"/>
+            <a:ext cx="14630400" cy="14630400"/>
+          </a:xfrm>
+          <a:prstGeom prst="rect">
+            <a:avLst/>
+          </a:prstGeom>
+        </p:spPr>
+      </p:pic>
+    </p:spTree>
+    <p:extLst>
+      <p:ext uri="{BB962C8B-B14F-4D97-AF65-F5344CB8AC3E}">
+        <p14:creationId xmlns:p14="http://schemas.microsoft.com/office/powerpoint/2010/main" val="3632676042"/>
       </p:ext>
     </p:extLst>
   </p:cSld>

</xml_diff>